<commit_message>
changes to a bunch of file;  including the mobisys2013 paper
</commit_message>
<xml_diff>
--- a/buildsys2012_energylens/figs/figs.pptx
+++ b/buildsys2012_energylens/figs/figs.pptx
@@ -7,6 +7,8 @@
   <p:sldIdLst>
     <p:sldId id="257" r:id="rId2"/>
     <p:sldId id="258" r:id="rId3"/>
+    <p:sldId id="259" r:id="rId4"/>
+    <p:sldId id="260" r:id="rId5"/>
   </p:sldIdLst>
   <p:sldSz cx="9144000" cy="6858000" type="screen4x3"/>
   <p:notesSz cx="6858000" cy="9144000"/>
@@ -289,7 +291,7 @@
           <a:p>
             <a:fld id="{22BCCA7B-53C2-8840-A275-6699EE9C71DB}" type="datetimeFigureOut">
               <a:rPr lang="en-US" smtClean="0"/>
-              <a:t>8/5/12</a:t>
+              <a:t>9/24/12</a:t>
             </a:fld>
             <a:endParaRPr lang="en-US"/>
           </a:p>
@@ -459,7 +461,7 @@
           <a:p>
             <a:fld id="{22BCCA7B-53C2-8840-A275-6699EE9C71DB}" type="datetimeFigureOut">
               <a:rPr lang="en-US" smtClean="0"/>
-              <a:t>8/5/12</a:t>
+              <a:t>9/24/12</a:t>
             </a:fld>
             <a:endParaRPr lang="en-US"/>
           </a:p>
@@ -639,7 +641,7 @@
           <a:p>
             <a:fld id="{22BCCA7B-53C2-8840-A275-6699EE9C71DB}" type="datetimeFigureOut">
               <a:rPr lang="en-US" smtClean="0"/>
-              <a:t>8/5/12</a:t>
+              <a:t>9/24/12</a:t>
             </a:fld>
             <a:endParaRPr lang="en-US"/>
           </a:p>
@@ -809,7 +811,7 @@
           <a:p>
             <a:fld id="{22BCCA7B-53C2-8840-A275-6699EE9C71DB}" type="datetimeFigureOut">
               <a:rPr lang="en-US" smtClean="0"/>
-              <a:t>8/5/12</a:t>
+              <a:t>9/24/12</a:t>
             </a:fld>
             <a:endParaRPr lang="en-US"/>
           </a:p>
@@ -1055,7 +1057,7 @@
           <a:p>
             <a:fld id="{22BCCA7B-53C2-8840-A275-6699EE9C71DB}" type="datetimeFigureOut">
               <a:rPr lang="en-US" smtClean="0"/>
-              <a:t>8/5/12</a:t>
+              <a:t>9/24/12</a:t>
             </a:fld>
             <a:endParaRPr lang="en-US"/>
           </a:p>
@@ -1343,7 +1345,7 @@
           <a:p>
             <a:fld id="{22BCCA7B-53C2-8840-A275-6699EE9C71DB}" type="datetimeFigureOut">
               <a:rPr lang="en-US" smtClean="0"/>
-              <a:t>8/5/12</a:t>
+              <a:t>9/24/12</a:t>
             </a:fld>
             <a:endParaRPr lang="en-US"/>
           </a:p>
@@ -1765,7 +1767,7 @@
           <a:p>
             <a:fld id="{22BCCA7B-53C2-8840-A275-6699EE9C71DB}" type="datetimeFigureOut">
               <a:rPr lang="en-US" smtClean="0"/>
-              <a:t>8/5/12</a:t>
+              <a:t>9/24/12</a:t>
             </a:fld>
             <a:endParaRPr lang="en-US"/>
           </a:p>
@@ -1883,7 +1885,7 @@
           <a:p>
             <a:fld id="{22BCCA7B-53C2-8840-A275-6699EE9C71DB}" type="datetimeFigureOut">
               <a:rPr lang="en-US" smtClean="0"/>
-              <a:t>8/5/12</a:t>
+              <a:t>9/24/12</a:t>
             </a:fld>
             <a:endParaRPr lang="en-US"/>
           </a:p>
@@ -1978,7 +1980,7 @@
           <a:p>
             <a:fld id="{22BCCA7B-53C2-8840-A275-6699EE9C71DB}" type="datetimeFigureOut">
               <a:rPr lang="en-US" smtClean="0"/>
-              <a:t>8/5/12</a:t>
+              <a:t>9/24/12</a:t>
             </a:fld>
             <a:endParaRPr lang="en-US"/>
           </a:p>
@@ -2255,7 +2257,7 @@
           <a:p>
             <a:fld id="{22BCCA7B-53C2-8840-A275-6699EE9C71DB}" type="datetimeFigureOut">
               <a:rPr lang="en-US" smtClean="0"/>
-              <a:t>8/5/12</a:t>
+              <a:t>9/24/12</a:t>
             </a:fld>
             <a:endParaRPr lang="en-US"/>
           </a:p>
@@ -2508,7 +2510,7 @@
           <a:p>
             <a:fld id="{22BCCA7B-53C2-8840-A275-6699EE9C71DB}" type="datetimeFigureOut">
               <a:rPr lang="en-US" smtClean="0"/>
-              <a:t>8/5/12</a:t>
+              <a:t>9/24/12</a:t>
             </a:fld>
             <a:endParaRPr lang="en-US"/>
           </a:p>
@@ -2721,7 +2723,7 @@
           <a:p>
             <a:fld id="{22BCCA7B-53C2-8840-A275-6699EE9C71DB}" type="datetimeFigureOut">
               <a:rPr lang="en-US" smtClean="0"/>
-              <a:t>8/5/12</a:t>
+              <a:t>9/24/12</a:t>
             </a:fld>
             <a:endParaRPr lang="en-US"/>
           </a:p>
@@ -3238,7 +3240,7 @@
         </p:blipFill>
         <p:spPr>
           <a:xfrm>
-            <a:off x="-4" y="360753"/>
+            <a:off x="6410" y="1457455"/>
             <a:ext cx="9144004" cy="2077964"/>
           </a:xfrm>
           <a:prstGeom prst="rect">
@@ -3442,6 +3444,474 @@
     <p:extLst>
       <p:ext uri="{BB962C8B-B14F-4D97-AF65-F5344CB8AC3E}">
         <p14:creationId xmlns:p14="http://schemas.microsoft.com/office/powerpoint/2010/main" val="1083657574"/>
+      </p:ext>
+    </p:extLst>
+  </p:cSld>
+  <p:clrMapOvr>
+    <a:masterClrMapping/>
+  </p:clrMapOvr>
+</p:sld>
+</file>
+
+<file path=ppt/slides/slide3.xml><?xml version="1.0" encoding="utf-8"?>
+<p:sld xmlns:a="http://schemas.openxmlformats.org/drawingml/2006/main" xmlns:r="http://schemas.openxmlformats.org/officeDocument/2006/relationships" xmlns:p="http://schemas.openxmlformats.org/presentationml/2006/main">
+  <p:cSld>
+    <p:spTree>
+      <p:nvGrpSpPr>
+        <p:cNvPr id="1" name=""/>
+        <p:cNvGrpSpPr/>
+        <p:nvPr/>
+      </p:nvGrpSpPr>
+      <p:grpSpPr>
+        <a:xfrm>
+          <a:off x="0" y="0"/>
+          <a:ext cx="0" cy="0"/>
+          <a:chOff x="0" y="0"/>
+          <a:chExt cx="0" cy="0"/>
+        </a:xfrm>
+      </p:grpSpPr>
+      <p:pic>
+        <p:nvPicPr>
+          <p:cNvPr id="6" name="Picture 5"/>
+          <p:cNvPicPr>
+            <a:picLocks noChangeAspect="1"/>
+          </p:cNvPicPr>
+          <p:nvPr/>
+        </p:nvPicPr>
+        <p:blipFill>
+          <a:blip r:embed="rId2"/>
+          <a:stretch>
+            <a:fillRect/>
+          </a:stretch>
+        </p:blipFill>
+        <p:spPr>
+          <a:xfrm>
+            <a:off x="0" y="2269110"/>
+            <a:ext cx="9144000" cy="2077964"/>
+          </a:xfrm>
+          <a:prstGeom prst="rect">
+            <a:avLst/>
+          </a:prstGeom>
+        </p:spPr>
+      </p:pic>
+      <p:pic>
+        <p:nvPicPr>
+          <p:cNvPr id="8" name="Picture 7"/>
+          <p:cNvPicPr>
+            <a:picLocks noChangeAspect="1"/>
+          </p:cNvPicPr>
+          <p:nvPr/>
+        </p:nvPicPr>
+        <p:blipFill>
+          <a:blip r:embed="rId3"/>
+          <a:stretch>
+            <a:fillRect/>
+          </a:stretch>
+        </p:blipFill>
+        <p:spPr>
+          <a:xfrm>
+            <a:off x="0" y="67656"/>
+            <a:ext cx="9144000" cy="2077964"/>
+          </a:xfrm>
+          <a:prstGeom prst="rect">
+            <a:avLst/>
+          </a:prstGeom>
+        </p:spPr>
+      </p:pic>
+      <p:sp>
+        <p:nvSpPr>
+          <p:cNvPr id="9" name="Rectangle 8"/>
+          <p:cNvSpPr/>
+          <p:nvPr/>
+        </p:nvSpPr>
+        <p:spPr>
+          <a:xfrm>
+            <a:off x="-4" y="67656"/>
+            <a:ext cx="9144000" cy="2077964"/>
+          </a:xfrm>
+          <a:prstGeom prst="rect">
+            <a:avLst/>
+          </a:prstGeom>
+          <a:noFill/>
+          <a:ln>
+            <a:solidFill>
+              <a:schemeClr val="tx1"/>
+            </a:solidFill>
+          </a:ln>
+        </p:spPr>
+        <p:style>
+          <a:lnRef idx="1">
+            <a:schemeClr val="accent1"/>
+          </a:lnRef>
+          <a:fillRef idx="3">
+            <a:schemeClr val="accent1"/>
+          </a:fillRef>
+          <a:effectRef idx="2">
+            <a:schemeClr val="accent1"/>
+          </a:effectRef>
+          <a:fontRef idx="minor">
+            <a:schemeClr val="lt1"/>
+          </a:fontRef>
+        </p:style>
+        <p:txBody>
+          <a:bodyPr rtlCol="0" anchor="ctr"/>
+          <a:lstStyle/>
+          <a:p>
+            <a:pPr algn="ctr"/>
+            <a:endParaRPr lang="en-US"/>
+          </a:p>
+        </p:txBody>
+      </p:sp>
+      <p:sp>
+        <p:nvSpPr>
+          <p:cNvPr id="10" name="Rectangle 9"/>
+          <p:cNvSpPr/>
+          <p:nvPr/>
+        </p:nvSpPr>
+        <p:spPr>
+          <a:xfrm>
+            <a:off x="0" y="2269110"/>
+            <a:ext cx="9144000" cy="2077964"/>
+          </a:xfrm>
+          <a:prstGeom prst="rect">
+            <a:avLst/>
+          </a:prstGeom>
+          <a:noFill/>
+          <a:ln>
+            <a:solidFill>
+              <a:schemeClr val="tx1"/>
+            </a:solidFill>
+          </a:ln>
+        </p:spPr>
+        <p:style>
+          <a:lnRef idx="1">
+            <a:schemeClr val="accent1"/>
+          </a:lnRef>
+          <a:fillRef idx="3">
+            <a:schemeClr val="accent1"/>
+          </a:fillRef>
+          <a:effectRef idx="2">
+            <a:schemeClr val="accent1"/>
+          </a:effectRef>
+          <a:fontRef idx="minor">
+            <a:schemeClr val="lt1"/>
+          </a:fontRef>
+        </p:style>
+        <p:txBody>
+          <a:bodyPr rtlCol="0" anchor="ctr"/>
+          <a:lstStyle/>
+          <a:p>
+            <a:pPr algn="ctr"/>
+            <a:endParaRPr lang="en-US"/>
+          </a:p>
+        </p:txBody>
+      </p:sp>
+      <p:sp>
+        <p:nvSpPr>
+          <p:cNvPr id="11" name="Rectangle 10"/>
+          <p:cNvSpPr/>
+          <p:nvPr/>
+        </p:nvSpPr>
+        <p:spPr>
+          <a:xfrm>
+            <a:off x="-4" y="4487824"/>
+            <a:ext cx="9144000" cy="2077964"/>
+          </a:xfrm>
+          <a:prstGeom prst="rect">
+            <a:avLst/>
+          </a:prstGeom>
+          <a:noFill/>
+          <a:ln>
+            <a:solidFill>
+              <a:schemeClr val="tx1"/>
+            </a:solidFill>
+          </a:ln>
+        </p:spPr>
+        <p:style>
+          <a:lnRef idx="1">
+            <a:schemeClr val="accent1"/>
+          </a:lnRef>
+          <a:fillRef idx="3">
+            <a:schemeClr val="accent1"/>
+          </a:fillRef>
+          <a:effectRef idx="2">
+            <a:schemeClr val="accent1"/>
+          </a:effectRef>
+          <a:fontRef idx="minor">
+            <a:schemeClr val="lt1"/>
+          </a:fontRef>
+        </p:style>
+        <p:txBody>
+          <a:bodyPr rtlCol="0" anchor="ctr"/>
+          <a:lstStyle/>
+          <a:p>
+            <a:pPr algn="ctr"/>
+            <a:endParaRPr lang="en-US"/>
+          </a:p>
+        </p:txBody>
+      </p:sp>
+      <p:pic>
+        <p:nvPicPr>
+          <p:cNvPr id="12" name="Picture 11"/>
+          <p:cNvPicPr>
+            <a:picLocks noChangeAspect="1"/>
+          </p:cNvPicPr>
+          <p:nvPr/>
+        </p:nvPicPr>
+        <p:blipFill>
+          <a:blip r:embed="rId4"/>
+          <a:stretch>
+            <a:fillRect/>
+          </a:stretch>
+        </p:blipFill>
+        <p:spPr>
+          <a:xfrm>
+            <a:off x="55820" y="4529694"/>
+            <a:ext cx="9042826" cy="1904370"/>
+          </a:xfrm>
+          <a:prstGeom prst="rect">
+            <a:avLst/>
+          </a:prstGeom>
+        </p:spPr>
+      </p:pic>
+    </p:spTree>
+    <p:extLst>
+      <p:ext uri="{BB962C8B-B14F-4D97-AF65-F5344CB8AC3E}">
+        <p14:creationId xmlns:p14="http://schemas.microsoft.com/office/powerpoint/2010/main" val="3873296594"/>
+      </p:ext>
+    </p:extLst>
+  </p:cSld>
+  <p:clrMapOvr>
+    <a:masterClrMapping/>
+  </p:clrMapOvr>
+</p:sld>
+</file>
+
+<file path=ppt/slides/slide4.xml><?xml version="1.0" encoding="utf-8"?>
+<p:sld xmlns:a="http://schemas.openxmlformats.org/drawingml/2006/main" xmlns:r="http://schemas.openxmlformats.org/officeDocument/2006/relationships" xmlns:p="http://schemas.openxmlformats.org/presentationml/2006/main">
+  <p:cSld>
+    <p:spTree>
+      <p:nvGrpSpPr>
+        <p:cNvPr id="1" name=""/>
+        <p:cNvGrpSpPr/>
+        <p:nvPr/>
+      </p:nvGrpSpPr>
+      <p:grpSpPr>
+        <a:xfrm>
+          <a:off x="0" y="0"/>
+          <a:ext cx="0" cy="0"/>
+          <a:chOff x="0" y="0"/>
+          <a:chExt cx="0" cy="0"/>
+        </a:xfrm>
+      </p:grpSpPr>
+      <p:pic>
+        <p:nvPicPr>
+          <p:cNvPr id="2" name="Picture 1"/>
+          <p:cNvPicPr>
+            <a:picLocks noChangeAspect="1"/>
+          </p:cNvPicPr>
+          <p:nvPr/>
+        </p:nvPicPr>
+        <p:blipFill>
+          <a:blip r:embed="rId2"/>
+          <a:stretch>
+            <a:fillRect/>
+          </a:stretch>
+        </p:blipFill>
+        <p:spPr>
+          <a:xfrm>
+            <a:off x="-4" y="686515"/>
+            <a:ext cx="9144000" cy="1807823"/>
+          </a:xfrm>
+          <a:prstGeom prst="rect">
+            <a:avLst/>
+          </a:prstGeom>
+        </p:spPr>
+      </p:pic>
+      <p:pic>
+        <p:nvPicPr>
+          <p:cNvPr id="3" name="Picture 2"/>
+          <p:cNvPicPr>
+            <a:picLocks noChangeAspect="1"/>
+          </p:cNvPicPr>
+          <p:nvPr/>
+        </p:nvPicPr>
+        <p:blipFill>
+          <a:blip r:embed="rId3"/>
+          <a:stretch>
+            <a:fillRect/>
+          </a:stretch>
+        </p:blipFill>
+        <p:spPr>
+          <a:xfrm>
+            <a:off x="-4" y="2494338"/>
+            <a:ext cx="9144000" cy="1772384"/>
+          </a:xfrm>
+          <a:prstGeom prst="rect">
+            <a:avLst/>
+          </a:prstGeom>
+        </p:spPr>
+      </p:pic>
+      <p:pic>
+        <p:nvPicPr>
+          <p:cNvPr id="4" name="Picture 3"/>
+          <p:cNvPicPr>
+            <a:picLocks noChangeAspect="1"/>
+          </p:cNvPicPr>
+          <p:nvPr/>
+        </p:nvPicPr>
+        <p:blipFill>
+          <a:blip r:embed="rId4"/>
+          <a:stretch>
+            <a:fillRect/>
+          </a:stretch>
+        </p:blipFill>
+        <p:spPr>
+          <a:xfrm>
+            <a:off x="-4" y="4266722"/>
+            <a:ext cx="9144000" cy="1832352"/>
+          </a:xfrm>
+          <a:prstGeom prst="rect">
+            <a:avLst/>
+          </a:prstGeom>
+        </p:spPr>
+      </p:pic>
+      <p:sp>
+        <p:nvSpPr>
+          <p:cNvPr id="5" name="Rectangle 4"/>
+          <p:cNvSpPr/>
+          <p:nvPr/>
+        </p:nvSpPr>
+        <p:spPr>
+          <a:xfrm>
+            <a:off x="-4" y="686515"/>
+            <a:ext cx="9144000" cy="1807823"/>
+          </a:xfrm>
+          <a:prstGeom prst="rect">
+            <a:avLst/>
+          </a:prstGeom>
+          <a:noFill/>
+          <a:ln>
+            <a:solidFill>
+              <a:schemeClr val="tx1"/>
+            </a:solidFill>
+          </a:ln>
+        </p:spPr>
+        <p:style>
+          <a:lnRef idx="1">
+            <a:schemeClr val="accent1"/>
+          </a:lnRef>
+          <a:fillRef idx="3">
+            <a:schemeClr val="accent1"/>
+          </a:fillRef>
+          <a:effectRef idx="2">
+            <a:schemeClr val="accent1"/>
+          </a:effectRef>
+          <a:fontRef idx="minor">
+            <a:schemeClr val="lt1"/>
+          </a:fontRef>
+        </p:style>
+        <p:txBody>
+          <a:bodyPr rtlCol="0" anchor="ctr"/>
+          <a:lstStyle/>
+          <a:p>
+            <a:pPr algn="ctr"/>
+            <a:endParaRPr lang="en-US"/>
+          </a:p>
+        </p:txBody>
+      </p:sp>
+      <p:sp>
+        <p:nvSpPr>
+          <p:cNvPr id="7" name="Rectangle 6"/>
+          <p:cNvSpPr/>
+          <p:nvPr/>
+        </p:nvSpPr>
+        <p:spPr>
+          <a:xfrm>
+            <a:off x="-4" y="2494338"/>
+            <a:ext cx="9144000" cy="1772384"/>
+          </a:xfrm>
+          <a:prstGeom prst="rect">
+            <a:avLst/>
+          </a:prstGeom>
+          <a:noFill/>
+          <a:ln>
+            <a:solidFill>
+              <a:schemeClr val="tx1"/>
+            </a:solidFill>
+          </a:ln>
+        </p:spPr>
+        <p:style>
+          <a:lnRef idx="1">
+            <a:schemeClr val="accent1"/>
+          </a:lnRef>
+          <a:fillRef idx="3">
+            <a:schemeClr val="accent1"/>
+          </a:fillRef>
+          <a:effectRef idx="2">
+            <a:schemeClr val="accent1"/>
+          </a:effectRef>
+          <a:fontRef idx="minor">
+            <a:schemeClr val="lt1"/>
+          </a:fontRef>
+        </p:style>
+        <p:txBody>
+          <a:bodyPr rtlCol="0" anchor="ctr"/>
+          <a:lstStyle/>
+          <a:p>
+            <a:pPr algn="ctr"/>
+            <a:endParaRPr lang="en-US"/>
+          </a:p>
+        </p:txBody>
+      </p:sp>
+      <p:sp>
+        <p:nvSpPr>
+          <p:cNvPr id="8" name="Rectangle 7"/>
+          <p:cNvSpPr/>
+          <p:nvPr/>
+        </p:nvSpPr>
+        <p:spPr>
+          <a:xfrm>
+            <a:off x="-4" y="4293261"/>
+            <a:ext cx="9144000" cy="1805813"/>
+          </a:xfrm>
+          <a:prstGeom prst="rect">
+            <a:avLst/>
+          </a:prstGeom>
+          <a:noFill/>
+          <a:ln>
+            <a:solidFill>
+              <a:schemeClr val="tx1"/>
+            </a:solidFill>
+          </a:ln>
+        </p:spPr>
+        <p:style>
+          <a:lnRef idx="1">
+            <a:schemeClr val="accent1"/>
+          </a:lnRef>
+          <a:fillRef idx="3">
+            <a:schemeClr val="accent1"/>
+          </a:fillRef>
+          <a:effectRef idx="2">
+            <a:schemeClr val="accent1"/>
+          </a:effectRef>
+          <a:fontRef idx="minor">
+            <a:schemeClr val="lt1"/>
+          </a:fontRef>
+        </p:style>
+        <p:txBody>
+          <a:bodyPr rtlCol="0" anchor="ctr"/>
+          <a:lstStyle/>
+          <a:p>
+            <a:pPr algn="ctr"/>
+            <a:endParaRPr lang="en-US"/>
+          </a:p>
+        </p:txBody>
+      </p:sp>
+    </p:spTree>
+    <p:extLst>
+      <p:ext uri="{BB962C8B-B14F-4D97-AF65-F5344CB8AC3E}">
+        <p14:creationId xmlns:p14="http://schemas.microsoft.com/office/powerpoint/2010/main" val="3244318846"/>
       </p:ext>
     </p:extLst>
   </p:cSld>

</xml_diff>